<commit_message>
Correcoes no power point
</commit_message>
<xml_diff>
--- a/empresa_transportes.pptx
+++ b/empresa_transportes.pptx
@@ -6642,15 +6642,14 @@
             <a:pPr algn="just"/>
             <a:r>
               <a:rPr lang="pt-PT" dirty="0"/>
-              <a:t>Uma das funcionalidades extra (não exigidas pelo enunciado do problema), é o horário de trabalho dos funcionários e dos serviços de transporte, que têm que coincidir para que o serviço de transporte seja bem sucedido, isto é, para que um serviço de transporte se possa realizar, é necessário que exista pelo menos um motorista devidamente preparado, cujo horário de trabalho abranja o horário marcado para o serviço de transporte. Caso isto não aconteça, é lançada a exceção </a:t>
-            </a:r>
-            <a:r>
-              <a:rPr lang="pt-PT" dirty="0" err="1"/>
-              <a:t>MotoristasIndisponiveis</a:t>
-            </a:r>
+              <a:t>Uma das funcionalidades extra (não exigidas pelo enunciado do problema), é o horário de trabalho dos funcionários e dos serviços de transporte. Se um serviço ocorre a uma determinada hora, é necessário que haja um motorista cujo horário de trabalho coincida com o horário do serviço. </a:t>
+            </a:r>
+          </a:p>
+          <a:p>
+            <a:pPr algn="just"/>
             <a:r>
               <a:rPr lang="pt-PT" dirty="0"/>
-              <a:t>.</a:t>
+              <a:t>Este método permite também atualizar o número total de horas de trabalho do motorista.</a:t>
             </a:r>
           </a:p>
         </p:txBody>
@@ -6874,7 +6873,7 @@
         <p:spPr>
           <a:xfrm>
             <a:off x="1035270" y="3307724"/>
-            <a:ext cx="5055406" cy="2862322"/>
+            <a:ext cx="5055406" cy="1631216"/>
           </a:xfrm>
           <a:prstGeom prst="rect">
             <a:avLst/>
@@ -6913,14 +6912,32 @@
                   </a:outerShdw>
                 </a:effectLst>
               </a:rPr>
-              <a:t>Outra dificuldade encontrada foi a organização e distribuição da informação nos ficheiros de texto.</a:t>
-            </a:r>
-          </a:p>
-          <a:p>
-            <a:pPr marL="342900" indent="-342900" algn="just">
-              <a:buFont typeface="Arial" panose="020B0604020202020204" pitchFamily="34" charset="0"/>
-              <a:buChar char="•"/>
-            </a:pPr>
+              <a:t>Outra dificuldade encontrada foi permitir o avançar do tempo, atualizando os membros-dado da oficina (disponibilidade ) e data (</a:t>
+            </a:r>
+            <a:r>
+              <a:rPr lang="pt-PT" sz="2000" dirty="0" err="1">
+                <a:ln>
+                  <a:solidFill>
+                    <a:schemeClr val="bg1">
+                      <a:lumMod val="75000"/>
+                      <a:lumOff val="25000"/>
+                      <a:alpha val="10000"/>
+                    </a:schemeClr>
+                  </a:solidFill>
+                </a:ln>
+                <a:solidFill>
+                  <a:schemeClr val="tx2"/>
+                </a:solidFill>
+                <a:effectLst>
+                  <a:outerShdw blurRad="9525" dist="25400" dir="14640000" algn="tl" rotWithShape="0">
+                    <a:schemeClr val="bg1">
+                      <a:alpha val="30000"/>
+                    </a:schemeClr>
+                  </a:outerShdw>
+                </a:effectLst>
+              </a:rPr>
+              <a:t>next_available_date</a:t>
+            </a:r>
             <a:r>
               <a:rPr lang="pt-PT" sz="2000" dirty="0">
                 <a:ln>
@@ -6943,7 +6960,7 @@
                   </a:outerShdw>
                 </a:effectLst>
               </a:rPr>
-              <a:t>Para além disso, o enunciado parecia-nos um pouco vago, o que acabou por nos dar mais liberdade no desenvolvimento do projeto, mas que, no início, nos deixou um pouco confusos sobre como deveriam ser implementados diversos objetivos.</a:t>
+              <a:t>).</a:t>
             </a:r>
           </a:p>
         </p:txBody>
@@ -7411,15 +7428,7 @@
             </a:r>
             <a:r>
               <a:rPr lang="en-US" dirty="0"/>
-              <a:t> de horas </a:t>
-            </a:r>
-            <a:r>
-              <a:rPr lang="en-US" dirty="0" err="1"/>
-              <a:t>díarias</a:t>
-            </a:r>
-            <a:r>
-              <a:rPr lang="en-US" dirty="0"/>
-              <a:t> </a:t>
+              <a:t> de total de horas </a:t>
             </a:r>
             <a:r>
               <a:rPr lang="en-US" dirty="0" err="1"/>
@@ -7938,12 +7947,106 @@
           </a:prstGeom>
         </p:spPr>
       </p:pic>
+      <p:sp>
+        <p:nvSpPr>
+          <p:cNvPr id="6" name="CaixaDeTexto 5">
+            <a:extLst>
+              <a:ext uri="{FF2B5EF4-FFF2-40B4-BE49-F238E27FC236}">
+                <a16:creationId xmlns:a16="http://schemas.microsoft.com/office/drawing/2014/main" id="{3AE6A475-683B-4862-8969-A60E21E4E2FB}"/>
+              </a:ext>
+            </a:extLst>
+          </p:cNvPr>
+          <p:cNvSpPr txBox="1"/>
+          <p:nvPr/>
+        </p:nvSpPr>
+        <p:spPr>
+          <a:xfrm>
+            <a:off x="1004052" y="2834294"/>
+            <a:ext cx="3612193" cy="369332"/>
+          </a:xfrm>
+          <a:prstGeom prst="rect">
+            <a:avLst/>
+          </a:prstGeom>
+          <a:noFill/>
+        </p:spPr>
+        <p:txBody>
+          <a:bodyPr wrap="square" rtlCol="0">
+            <a:spAutoFit/>
+          </a:bodyPr>
+          <a:lstStyle/>
+          <a:p>
+            <a:r>
+              <a:rPr lang="pt-PT" dirty="0"/>
+              <a:t>Operadores para BST</a:t>
+            </a:r>
+          </a:p>
+        </p:txBody>
+      </p:sp>
+      <p:sp>
+        <p:nvSpPr>
+          <p:cNvPr id="8" name="CaixaDeTexto 7">
+            <a:extLst>
+              <a:ext uri="{FF2B5EF4-FFF2-40B4-BE49-F238E27FC236}">
+                <a16:creationId xmlns:a16="http://schemas.microsoft.com/office/drawing/2014/main" id="{33467F67-CB23-4561-A959-7ACBF47CCF91}"/>
+              </a:ext>
+            </a:extLst>
+          </p:cNvPr>
+          <p:cNvSpPr txBox="1"/>
+          <p:nvPr/>
+        </p:nvSpPr>
+        <p:spPr>
+          <a:xfrm>
+            <a:off x="6206248" y="2677212"/>
+            <a:ext cx="5151566" cy="646331"/>
+          </a:xfrm>
+          <a:prstGeom prst="rect">
+            <a:avLst/>
+          </a:prstGeom>
+          <a:noFill/>
+        </p:spPr>
+        <p:txBody>
+          <a:bodyPr wrap="square" rtlCol="0">
+            <a:spAutoFit/>
+          </a:bodyPr>
+          <a:lstStyle/>
+          <a:p>
+            <a:r>
+              <a:rPr lang="pt-PT" dirty="0"/>
+              <a:t>Criação de uma </a:t>
+            </a:r>
+            <a:r>
+              <a:rPr lang="pt-PT" dirty="0" err="1"/>
+              <a:t>struct</a:t>
+            </a:r>
+            <a:r>
+              <a:rPr lang="pt-PT" dirty="0"/>
+              <a:t> para a </a:t>
+            </a:r>
+            <a:r>
+              <a:rPr lang="pt-PT" dirty="0" err="1"/>
+              <a:t>hash</a:t>
+            </a:r>
+            <a:r>
+              <a:rPr lang="pt-PT" dirty="0"/>
+              <a:t> </a:t>
+            </a:r>
+            <a:r>
+              <a:rPr lang="pt-PT" dirty="0" err="1"/>
+              <a:t>table</a:t>
+            </a:r>
+            <a:r>
+              <a:rPr lang="pt-PT" dirty="0"/>
+              <a:t> dos clientes inativos</a:t>
+            </a:r>
+          </a:p>
+        </p:txBody>
+      </p:sp>
       <p:pic>
         <p:nvPicPr>
-          <p:cNvPr id="5" name="Imagem 4">
+          <p:cNvPr id="7" name="Imagem 6">
             <a:extLst>
               <a:ext uri="{FF2B5EF4-FFF2-40B4-BE49-F238E27FC236}">
-                <a16:creationId xmlns:a16="http://schemas.microsoft.com/office/drawing/2014/main" id="{194727B3-7A72-4732-A243-98714C70E1CD}"/>
+                <a16:creationId xmlns:a16="http://schemas.microsoft.com/office/drawing/2014/main" id="{949CDC09-DAA2-44D9-AF8F-43CE4D2B48A4}"/>
               </a:ext>
             </a:extLst>
           </p:cNvPr>
@@ -7960,108 +8063,14 @@
         </p:blipFill>
         <p:spPr>
           <a:xfrm>
-            <a:off x="6206248" y="3305172"/>
-            <a:ext cx="5151566" cy="1905165"/>
+            <a:off x="5381005" y="3323543"/>
+            <a:ext cx="5806943" cy="1981372"/>
           </a:xfrm>
           <a:prstGeom prst="rect">
             <a:avLst/>
           </a:prstGeom>
         </p:spPr>
       </p:pic>
-      <p:sp>
-        <p:nvSpPr>
-          <p:cNvPr id="6" name="CaixaDeTexto 5">
-            <a:extLst>
-              <a:ext uri="{FF2B5EF4-FFF2-40B4-BE49-F238E27FC236}">
-                <a16:creationId xmlns:a16="http://schemas.microsoft.com/office/drawing/2014/main" id="{3AE6A475-683B-4862-8969-A60E21E4E2FB}"/>
-              </a:ext>
-            </a:extLst>
-          </p:cNvPr>
-          <p:cNvSpPr txBox="1"/>
-          <p:nvPr/>
-        </p:nvSpPr>
-        <p:spPr>
-          <a:xfrm>
-            <a:off x="1004052" y="2834294"/>
-            <a:ext cx="3612193" cy="369332"/>
-          </a:xfrm>
-          <a:prstGeom prst="rect">
-            <a:avLst/>
-          </a:prstGeom>
-          <a:noFill/>
-        </p:spPr>
-        <p:txBody>
-          <a:bodyPr wrap="square" rtlCol="0">
-            <a:spAutoFit/>
-          </a:bodyPr>
-          <a:lstStyle/>
-          <a:p>
-            <a:r>
-              <a:rPr lang="pt-PT" dirty="0"/>
-              <a:t>Operadores para BST</a:t>
-            </a:r>
-          </a:p>
-        </p:txBody>
-      </p:sp>
-      <p:sp>
-        <p:nvSpPr>
-          <p:cNvPr id="8" name="CaixaDeTexto 7">
-            <a:extLst>
-              <a:ext uri="{FF2B5EF4-FFF2-40B4-BE49-F238E27FC236}">
-                <a16:creationId xmlns:a16="http://schemas.microsoft.com/office/drawing/2014/main" id="{33467F67-CB23-4561-A959-7ACBF47CCF91}"/>
-              </a:ext>
-            </a:extLst>
-          </p:cNvPr>
-          <p:cNvSpPr txBox="1"/>
-          <p:nvPr/>
-        </p:nvSpPr>
-        <p:spPr>
-          <a:xfrm>
-            <a:off x="6206248" y="2677212"/>
-            <a:ext cx="5151566" cy="646331"/>
-          </a:xfrm>
-          <a:prstGeom prst="rect">
-            <a:avLst/>
-          </a:prstGeom>
-          <a:noFill/>
-        </p:spPr>
-        <p:txBody>
-          <a:bodyPr wrap="square" rtlCol="0">
-            <a:spAutoFit/>
-          </a:bodyPr>
-          <a:lstStyle/>
-          <a:p>
-            <a:r>
-              <a:rPr lang="pt-PT" dirty="0"/>
-              <a:t>Criação de uma </a:t>
-            </a:r>
-            <a:r>
-              <a:rPr lang="pt-PT" dirty="0" err="1"/>
-              <a:t>struct</a:t>
-            </a:r>
-            <a:r>
-              <a:rPr lang="pt-PT" dirty="0"/>
-              <a:t> para a </a:t>
-            </a:r>
-            <a:r>
-              <a:rPr lang="pt-PT" dirty="0" err="1"/>
-              <a:t>hash</a:t>
-            </a:r>
-            <a:r>
-              <a:rPr lang="pt-PT" dirty="0"/>
-              <a:t> </a:t>
-            </a:r>
-            <a:r>
-              <a:rPr lang="pt-PT" dirty="0" err="1"/>
-              <a:t>table</a:t>
-            </a:r>
-            <a:r>
-              <a:rPr lang="pt-PT" dirty="0"/>
-              <a:t> dos clientes inativos</a:t>
-            </a:r>
-          </a:p>
-        </p:txBody>
-      </p:sp>
     </p:spTree>
     <p:extLst>
       <p:ext uri="{BB962C8B-B14F-4D97-AF65-F5344CB8AC3E}">
@@ -9595,12 +9604,71 @@
           </a:p>
         </p:txBody>
       </p:sp>
+      <p:sp>
+        <p:nvSpPr>
+          <p:cNvPr id="5" name="CaixaDeTexto 4">
+            <a:extLst>
+              <a:ext uri="{FF2B5EF4-FFF2-40B4-BE49-F238E27FC236}">
+                <a16:creationId xmlns:a16="http://schemas.microsoft.com/office/drawing/2014/main" id="{6D39ACDF-DD3A-4CB2-AA80-7F29DC22A880}"/>
+              </a:ext>
+            </a:extLst>
+          </p:cNvPr>
+          <p:cNvSpPr txBox="1"/>
+          <p:nvPr/>
+        </p:nvSpPr>
+        <p:spPr>
+          <a:xfrm>
+            <a:off x="1197204" y="2865748"/>
+            <a:ext cx="3733015" cy="1323439"/>
+          </a:xfrm>
+          <a:prstGeom prst="rect">
+            <a:avLst/>
+          </a:prstGeom>
+          <a:noFill/>
+        </p:spPr>
+        <p:txBody>
+          <a:bodyPr wrap="square" rtlCol="0">
+            <a:spAutoFit/>
+          </a:bodyPr>
+          <a:lstStyle/>
+          <a:p>
+            <a:r>
+              <a:rPr lang="pt-PT" sz="2000" dirty="0">
+                <a:ln>
+                  <a:solidFill>
+                    <a:schemeClr val="bg1">
+                      <a:lumMod val="75000"/>
+                      <a:lumOff val="25000"/>
+                      <a:alpha val="10000"/>
+                    </a:schemeClr>
+                  </a:solidFill>
+                </a:ln>
+                <a:solidFill>
+                  <a:schemeClr val="tx2"/>
+                </a:solidFill>
+                <a:effectLst>
+                  <a:outerShdw blurRad="9525" dist="25400" dir="14640000" algn="tl" rotWithShape="0">
+                    <a:schemeClr val="bg1">
+                      <a:alpha val="30000"/>
+                    </a:schemeClr>
+                  </a:outerShdw>
+                </a:effectLst>
+              </a:rPr>
+              <a:t>Quanto ao uso de estruturas de dados, foram implementadas as estruturas desejadas com sucesso</a:t>
+            </a:r>
+            <a:r>
+              <a:rPr lang="pt-PT" dirty="0"/>
+              <a:t>.</a:t>
+            </a:r>
+          </a:p>
+        </p:txBody>
+      </p:sp>
       <p:pic>
         <p:nvPicPr>
-          <p:cNvPr id="4" name="Imagem 3">
+          <p:cNvPr id="6" name="Imagem 5">
             <a:extLst>
               <a:ext uri="{FF2B5EF4-FFF2-40B4-BE49-F238E27FC236}">
-                <a16:creationId xmlns:a16="http://schemas.microsoft.com/office/drawing/2014/main" id="{428F22BE-98DC-4156-9A9A-8B75A19C2535}"/>
+                <a16:creationId xmlns:a16="http://schemas.microsoft.com/office/drawing/2014/main" id="{FA1C8132-571C-4B1E-9572-85B86F3FAFBD}"/>
               </a:ext>
             </a:extLst>
           </p:cNvPr>
@@ -9617,8 +9685,8 @@
         </p:blipFill>
         <p:spPr>
           <a:xfrm>
-            <a:off x="5167829" y="2693773"/>
-            <a:ext cx="5456041" cy="2393977"/>
+            <a:off x="5656531" y="2654025"/>
+            <a:ext cx="6054314" cy="2793463"/>
           </a:xfrm>
           <a:prstGeom prst="rect">
             <a:avLst/>
@@ -9727,7 +9795,7 @@
         </p:blipFill>
         <p:spPr>
           <a:xfrm>
-            <a:off x="428332" y="348228"/>
+            <a:off x="447186" y="536764"/>
             <a:ext cx="3556757" cy="4530704"/>
           </a:xfrm>
           <a:prstGeom prst="rect">

</xml_diff>